<commit_message>
Tidying, better modules overview visual
</commit_message>
<xml_diff>
--- a/submissions/burning-questions/burning-questions-visuals.pptx
+++ b/submissions/burning-questions/burning-questions-visuals.pptx
@@ -17,7 +17,7 @@
     <p:sldId id="264" r:id="rId8"/>
     <p:sldId id="268" r:id="rId9"/>
     <p:sldId id="269" r:id="rId10"/>
-    <p:sldId id="275" r:id="rId11"/>
+    <p:sldId id="276" r:id="rId11"/>
     <p:sldId id="267" r:id="rId12"/>
     <p:sldId id="266" r:id="rId13"/>
     <p:sldId id="273" r:id="rId14"/>
@@ -225,7 +225,7 @@
           <a:p>
             <a:fld id="{8FC026D2-DA3E-42BC-8854-2B9156C9CD3C}" type="datetimeFigureOut">
               <a:rPr lang="en-US" smtClean="0"/>
-              <a:t>29-Apr-22</a:t>
+              <a:t>01-May-22</a:t>
             </a:fld>
             <a:endParaRPr lang="en-US"/>
           </a:p>
@@ -2784,7 +2784,7 @@
           <a:p>
             <a:fld id="{F30A3BE9-C2AB-48CC-AE4F-625C0E713B29}" type="datetimeFigureOut">
               <a:rPr lang="en-US" smtClean="0"/>
-              <a:t>29-Apr-22</a:t>
+              <a:t>01-May-22</a:t>
             </a:fld>
             <a:endParaRPr lang="en-US"/>
           </a:p>
@@ -2982,7 +2982,7 @@
           <a:p>
             <a:fld id="{F30A3BE9-C2AB-48CC-AE4F-625C0E713B29}" type="datetimeFigureOut">
               <a:rPr lang="en-US" smtClean="0"/>
-              <a:t>29-Apr-22</a:t>
+              <a:t>01-May-22</a:t>
             </a:fld>
             <a:endParaRPr lang="en-US"/>
           </a:p>
@@ -3190,7 +3190,7 @@
           <a:p>
             <a:fld id="{F30A3BE9-C2AB-48CC-AE4F-625C0E713B29}" type="datetimeFigureOut">
               <a:rPr lang="en-US" smtClean="0"/>
-              <a:t>29-Apr-22</a:t>
+              <a:t>01-May-22</a:t>
             </a:fld>
             <a:endParaRPr lang="en-US"/>
           </a:p>
@@ -3388,7 +3388,7 @@
           <a:p>
             <a:fld id="{F30A3BE9-C2AB-48CC-AE4F-625C0E713B29}" type="datetimeFigureOut">
               <a:rPr lang="en-US" smtClean="0"/>
-              <a:t>29-Apr-22</a:t>
+              <a:t>01-May-22</a:t>
             </a:fld>
             <a:endParaRPr lang="en-US"/>
           </a:p>
@@ -3663,7 +3663,7 @@
           <a:p>
             <a:fld id="{F30A3BE9-C2AB-48CC-AE4F-625C0E713B29}" type="datetimeFigureOut">
               <a:rPr lang="en-US" smtClean="0"/>
-              <a:t>29-Apr-22</a:t>
+              <a:t>01-May-22</a:t>
             </a:fld>
             <a:endParaRPr lang="en-US"/>
           </a:p>
@@ -3928,7 +3928,7 @@
           <a:p>
             <a:fld id="{F30A3BE9-C2AB-48CC-AE4F-625C0E713B29}" type="datetimeFigureOut">
               <a:rPr lang="en-US" smtClean="0"/>
-              <a:t>29-Apr-22</a:t>
+              <a:t>01-May-22</a:t>
             </a:fld>
             <a:endParaRPr lang="en-US"/>
           </a:p>
@@ -4340,7 +4340,7 @@
           <a:p>
             <a:fld id="{F30A3BE9-C2AB-48CC-AE4F-625C0E713B29}" type="datetimeFigureOut">
               <a:rPr lang="en-US" smtClean="0"/>
-              <a:t>29-Apr-22</a:t>
+              <a:t>01-May-22</a:t>
             </a:fld>
             <a:endParaRPr lang="en-US"/>
           </a:p>
@@ -4481,7 +4481,7 @@
           <a:p>
             <a:fld id="{F30A3BE9-C2AB-48CC-AE4F-625C0E713B29}" type="datetimeFigureOut">
               <a:rPr lang="en-US" smtClean="0"/>
-              <a:t>29-Apr-22</a:t>
+              <a:t>01-May-22</a:t>
             </a:fld>
             <a:endParaRPr lang="en-US"/>
           </a:p>
@@ -4594,7 +4594,7 @@
           <a:p>
             <a:fld id="{F30A3BE9-C2AB-48CC-AE4F-625C0E713B29}" type="datetimeFigureOut">
               <a:rPr lang="en-US" smtClean="0"/>
-              <a:t>29-Apr-22</a:t>
+              <a:t>01-May-22</a:t>
             </a:fld>
             <a:endParaRPr lang="en-US"/>
           </a:p>
@@ -4905,7 +4905,7 @@
           <a:p>
             <a:fld id="{F30A3BE9-C2AB-48CC-AE4F-625C0E713B29}" type="datetimeFigureOut">
               <a:rPr lang="en-US" smtClean="0"/>
-              <a:t>29-Apr-22</a:t>
+              <a:t>01-May-22</a:t>
             </a:fld>
             <a:endParaRPr lang="en-US"/>
           </a:p>
@@ -5193,7 +5193,7 @@
           <a:p>
             <a:fld id="{F30A3BE9-C2AB-48CC-AE4F-625C0E713B29}" type="datetimeFigureOut">
               <a:rPr lang="en-US" smtClean="0"/>
-              <a:t>29-Apr-22</a:t>
+              <a:t>01-May-22</a:t>
             </a:fld>
             <a:endParaRPr lang="en-US"/>
           </a:p>
@@ -5437,7 +5437,7 @@
           <a:p>
             <a:fld id="{F30A3BE9-C2AB-48CC-AE4F-625C0E713B29}" type="datetimeFigureOut">
               <a:rPr lang="en-US" smtClean="0"/>
-              <a:t>29-Apr-22</a:t>
+              <a:t>01-May-22</a:t>
             </a:fld>
             <a:endParaRPr lang="en-US"/>
           </a:p>
@@ -6874,10 +6874,10 @@
         </p:nvGrpSpPr>
         <p:grpSpPr>
           <a:xfrm>
-            <a:off x="3766199" y="1283295"/>
-            <a:ext cx="4706532" cy="461665"/>
-            <a:chOff x="4455335" y="818286"/>
-            <a:chExt cx="4873504" cy="461665"/>
+            <a:off x="3803374" y="1283295"/>
+            <a:ext cx="4585252" cy="461665"/>
+            <a:chOff x="4580918" y="818286"/>
+            <a:chExt cx="4747921" cy="461665"/>
           </a:xfrm>
         </p:grpSpPr>
         <p:sp>
@@ -6914,10 +6914,10 @@
                   <a:solidFill>
                     <a:schemeClr val="bg1"/>
                   </a:solidFill>
-                  <a:latin typeface="Arial" panose="020B0604020202020204" pitchFamily="34" charset="0"/>
-                  <a:cs typeface="Arial" panose="020B0604020202020204" pitchFamily="34" charset="0"/>
+                  <a:latin typeface="Courier New" panose="02070309020205020404" pitchFamily="49" charset="0"/>
+                  <a:cs typeface="Courier New" panose="02070309020205020404" pitchFamily="49" charset="0"/>
                 </a:rPr>
-                <a:t>E   =   P   </a:t>
+                <a:t>E = P </a:t>
               </a:r>
               <a:r>
                 <a:rPr lang="en-US" sz="2400" dirty="0">
@@ -6927,17 +6927,37 @@
                   <a:latin typeface="Arial" panose="020B0604020202020204" pitchFamily="34" charset="0"/>
                   <a:cs typeface="Arial" panose="020B0604020202020204" pitchFamily="34" charset="0"/>
                 </a:rPr>
-                <a:t>x </a:t>
+                <a:t>x</a:t>
+              </a:r>
+              <a:r>
+                <a:rPr lang="en-US" sz="2400" dirty="0">
+                  <a:solidFill>
+                    <a:schemeClr val="bg1"/>
+                  </a:solidFill>
+                  <a:latin typeface="Courier New" panose="02070309020205020404" pitchFamily="49" charset="0"/>
+                  <a:cs typeface="Courier New" panose="02070309020205020404" pitchFamily="49" charset="0"/>
+                </a:rPr>
+                <a:t> </a:t>
+              </a:r>
+              <a:r>
+                <a:rPr lang="en-US" sz="2400" b="1" dirty="0" err="1">
+                  <a:solidFill>
+                    <a:schemeClr val="bg1"/>
+                  </a:solidFill>
+                  <a:latin typeface="Courier New" panose="02070309020205020404" pitchFamily="49" charset="0"/>
+                  <a:cs typeface="Courier New" panose="02070309020205020404" pitchFamily="49" charset="0"/>
+                </a:rPr>
+                <a:t>t_c</a:t>
               </a:r>
               <a:r>
                 <a:rPr lang="en-US" sz="2400" b="1" dirty="0">
                   <a:solidFill>
                     <a:schemeClr val="bg1"/>
                   </a:solidFill>
-                  <a:latin typeface="Arial" panose="020B0604020202020204" pitchFamily="34" charset="0"/>
-                  <a:cs typeface="Arial" panose="020B0604020202020204" pitchFamily="34" charset="0"/>
+                  <a:latin typeface="Courier New" panose="02070309020205020404" pitchFamily="49" charset="0"/>
+                  <a:cs typeface="Courier New" panose="02070309020205020404" pitchFamily="49" charset="0"/>
                 </a:rPr>
-                <a:t>  t_c   </a:t>
+                <a:t> </a:t>
               </a:r>
               <a:r>
                 <a:rPr lang="en-US" sz="2400" dirty="0">
@@ -6954,10 +6974,10 @@
                   <a:solidFill>
                     <a:schemeClr val="bg1"/>
                   </a:solidFill>
-                  <a:latin typeface="Arial" panose="020B0604020202020204" pitchFamily="34" charset="0"/>
-                  <a:cs typeface="Arial" panose="020B0604020202020204" pitchFamily="34" charset="0"/>
+                  <a:latin typeface="Courier New" panose="02070309020205020404" pitchFamily="49" charset="0"/>
+                  <a:cs typeface="Courier New" panose="02070309020205020404" pitchFamily="49" charset="0"/>
                 </a:rPr>
-                <a:t>   n   /   C</a:t>
+                <a:t> n / C</a:t>
               </a:r>
             </a:p>
           </p:txBody>
@@ -7021,7 +7041,7 @@
           </p:blipFill>
           <p:spPr bwMode="auto">
             <a:xfrm>
-              <a:off x="4455335" y="869681"/>
+              <a:off x="4705237" y="869681"/>
               <a:ext cx="491199" cy="400110"/>
             </a:xfrm>
             <a:prstGeom prst="rect">
@@ -7042,10 +7062,10 @@
       </p:grpSp>
       <p:grpSp>
         <p:nvGrpSpPr>
-          <p:cNvPr id="13" name="Group 12">
-            <a:extLst>
-              <a:ext uri="{FF2B5EF4-FFF2-40B4-BE49-F238E27FC236}">
-                <a16:creationId xmlns:a16="http://schemas.microsoft.com/office/drawing/2014/main" id="{00E0EBE3-39AC-41F1-A183-94735F24AD25}"/>
+          <p:cNvPr id="18" name="Group 17">
+            <a:extLst>
+              <a:ext uri="{FF2B5EF4-FFF2-40B4-BE49-F238E27FC236}">
+                <a16:creationId xmlns:a16="http://schemas.microsoft.com/office/drawing/2014/main" id="{6823FF42-1DB7-406B-940B-5A1671A143A4}"/>
               </a:ext>
             </a:extLst>
           </p:cNvPr>
@@ -7054,297 +7074,384 @@
         </p:nvGrpSpPr>
         <p:grpSpPr>
           <a:xfrm>
-            <a:off x="4563759" y="2514600"/>
-            <a:ext cx="3064481" cy="3416320"/>
-            <a:chOff x="3969384" y="2519680"/>
-            <a:chExt cx="3064481" cy="3416320"/>
+            <a:off x="1310415" y="2372740"/>
+            <a:ext cx="9571171" cy="1342189"/>
+            <a:chOff x="1109216" y="2372740"/>
+            <a:chExt cx="9571171" cy="1342189"/>
           </a:xfrm>
         </p:grpSpPr>
-        <p:pic>
-          <p:nvPicPr>
-            <p:cNvPr id="5" name="Picture 2">
+        <p:grpSp>
+          <p:nvGrpSpPr>
+            <p:cNvPr id="4" name="Group 3">
               <a:extLst>
                 <a:ext uri="{FF2B5EF4-FFF2-40B4-BE49-F238E27FC236}">
-                  <a16:creationId xmlns:a16="http://schemas.microsoft.com/office/drawing/2014/main" id="{B3378E89-F7B5-41B5-A9E0-07D171424C1F}"/>
+                  <a16:creationId xmlns:a16="http://schemas.microsoft.com/office/drawing/2014/main" id="{7DFD22D0-110B-4A2F-B0D5-41E1162C0A28}"/>
                 </a:ext>
               </a:extLst>
             </p:cNvPr>
-            <p:cNvPicPr>
-              <a:picLocks noChangeAspect="1" noChangeArrowheads="1"/>
-            </p:cNvPicPr>
+            <p:cNvGrpSpPr/>
             <p:nvPr/>
-          </p:nvPicPr>
-          <p:blipFill>
-            <a:blip r:embed="rId4">
+          </p:nvGrpSpPr>
+          <p:grpSpPr>
+            <a:xfrm>
+              <a:off x="4257245" y="2514600"/>
+              <a:ext cx="3081482" cy="830997"/>
+              <a:chOff x="4467163" y="2514600"/>
+              <a:chExt cx="3081482" cy="830997"/>
+            </a:xfrm>
+          </p:grpSpPr>
+          <p:pic>
+            <p:nvPicPr>
+              <p:cNvPr id="7" name="Picture 4">
+                <a:extLst>
+                  <a:ext uri="{FF2B5EF4-FFF2-40B4-BE49-F238E27FC236}">
+                    <a16:creationId xmlns:a16="http://schemas.microsoft.com/office/drawing/2014/main" id="{2BCDBD1E-8627-4362-B4F9-A3E54B8D7002}"/>
+                  </a:ext>
+                </a:extLst>
+              </p:cNvPr>
+              <p:cNvPicPr>
+                <a:picLocks noChangeAspect="1" noChangeArrowheads="1"/>
+              </p:cNvPicPr>
+              <p:nvPr/>
+            </p:nvPicPr>
+            <p:blipFill>
+              <a:blip r:embed="rId4">
+                <a:extLst>
+                  <a:ext uri="{28A0092B-C50C-407E-A947-70E740481C1C}">
+                    <a14:useLocalDpi xmlns:a14="http://schemas.microsoft.com/office/drawing/2010/main" val="0"/>
+                  </a:ext>
+                </a:extLst>
+              </a:blip>
+              <a:srcRect/>
+              <a:stretch>
+                <a:fillRect/>
+              </a:stretch>
+            </p:blipFill>
+            <p:spPr bwMode="auto">
+              <a:xfrm>
+                <a:off x="4467163" y="2514602"/>
+                <a:ext cx="772236" cy="772236"/>
+              </a:xfrm>
+              <a:prstGeom prst="rect">
+                <a:avLst/>
+              </a:prstGeom>
+              <a:noFill/>
               <a:extLst>
-                <a:ext uri="{28A0092B-C50C-407E-A947-70E740481C1C}">
-                  <a14:useLocalDpi xmlns:a14="http://schemas.microsoft.com/office/drawing/2010/main" val="0"/>
+                <a:ext uri="{909E8E84-426E-40DD-AFC4-6F175D3DCCD1}">
+                  <a14:hiddenFill xmlns:a14="http://schemas.microsoft.com/office/drawing/2010/main">
+                    <a:solidFill>
+                      <a:srgbClr val="FFFFFF"/>
+                    </a:solidFill>
+                  </a14:hiddenFill>
                 </a:ext>
               </a:extLst>
-            </a:blip>
-            <a:srcRect/>
-            <a:stretch>
-              <a:fillRect/>
-            </a:stretch>
-          </p:blipFill>
-          <p:spPr bwMode="auto">
-            <a:xfrm>
-              <a:off x="3969384" y="4742240"/>
-              <a:ext cx="755016" cy="755016"/>
-            </a:xfrm>
-            <a:prstGeom prst="rect">
-              <a:avLst/>
-            </a:prstGeom>
-            <a:noFill/>
-            <a:extLst>
-              <a:ext uri="{909E8E84-426E-40DD-AFC4-6F175D3DCCD1}">
-                <a14:hiddenFill xmlns:a14="http://schemas.microsoft.com/office/drawing/2010/main">
-                  <a:solidFill>
-                    <a:srgbClr val="FFFFFF"/>
-                  </a:solidFill>
-                </a14:hiddenFill>
-              </a:ext>
-            </a:extLst>
-          </p:spPr>
-        </p:pic>
-        <p:pic>
-          <p:nvPicPr>
-            <p:cNvPr id="6" name="Picture 6">
+            </p:spPr>
+          </p:pic>
+          <p:sp>
+            <p:nvSpPr>
+              <p:cNvPr id="11" name="TextBox 10">
+                <a:extLst>
+                  <a:ext uri="{FF2B5EF4-FFF2-40B4-BE49-F238E27FC236}">
+                    <a16:creationId xmlns:a16="http://schemas.microsoft.com/office/drawing/2014/main" id="{52FD20C1-05CA-4688-92EF-F4D47EEA79FB}"/>
+                  </a:ext>
+                </a:extLst>
+              </p:cNvPr>
+              <p:cNvSpPr txBox="1"/>
+              <p:nvPr/>
+            </p:nvSpPr>
+            <p:spPr>
+              <a:xfrm>
+                <a:off x="5239180" y="2514600"/>
+                <a:ext cx="2309465" cy="830997"/>
+              </a:xfrm>
+              <a:prstGeom prst="rect">
+                <a:avLst/>
+              </a:prstGeom>
+              <a:noFill/>
+            </p:spPr>
+            <p:txBody>
+              <a:bodyPr wrap="square">
+                <a:spAutoFit/>
+              </a:bodyPr>
+              <a:lstStyle/>
+              <a:p>
+                <a:r>
+                  <a:rPr lang="en-US" sz="2400" b="1" dirty="0">
+                    <a:solidFill>
+                      <a:schemeClr val="bg1"/>
+                    </a:solidFill>
+                    <a:latin typeface="Courier New" panose="02070309020205020404" pitchFamily="49" charset="0"/>
+                    <a:cs typeface="Courier New" panose="02070309020205020404" pitchFamily="49" charset="0"/>
+                  </a:rPr>
+                  <a:t>+70% P</a:t>
+                </a:r>
+              </a:p>
+              <a:p>
+                <a:r>
+                  <a:rPr lang="en-US" sz="2400" b="1" dirty="0">
+                    <a:solidFill>
+                      <a:schemeClr val="bg1"/>
+                    </a:solidFill>
+                    <a:latin typeface="Courier New" panose="02070309020205020404" pitchFamily="49" charset="0"/>
+                    <a:cs typeface="Courier New" panose="02070309020205020404" pitchFamily="49" charset="0"/>
+                  </a:rPr>
+                  <a:t>+50% C</a:t>
+                </a:r>
+              </a:p>
+            </p:txBody>
+          </p:sp>
+        </p:grpSp>
+        <p:grpSp>
+          <p:nvGrpSpPr>
+            <p:cNvPr id="3" name="Group 2">
               <a:extLst>
                 <a:ext uri="{FF2B5EF4-FFF2-40B4-BE49-F238E27FC236}">
-                  <a16:creationId xmlns:a16="http://schemas.microsoft.com/office/drawing/2014/main" id="{E974CE4E-C46A-446A-8D4C-611FE54BC62F}"/>
+                  <a16:creationId xmlns:a16="http://schemas.microsoft.com/office/drawing/2014/main" id="{F8274DB2-C1F5-40AC-91B0-1BC8FF9F2615}"/>
                 </a:ext>
               </a:extLst>
             </p:cNvPr>
-            <p:cNvPicPr>
-              <a:picLocks noChangeAspect="1" noChangeArrowheads="1"/>
-            </p:cNvPicPr>
+            <p:cNvGrpSpPr/>
             <p:nvPr/>
-          </p:nvPicPr>
-          <p:blipFill>
-            <a:blip r:embed="rId5">
+          </p:nvGrpSpPr>
+          <p:grpSpPr>
+            <a:xfrm>
+              <a:off x="1109216" y="2514600"/>
+              <a:ext cx="3033766" cy="772238"/>
+              <a:chOff x="1109216" y="2514600"/>
+              <a:chExt cx="3033766" cy="772238"/>
+            </a:xfrm>
+          </p:grpSpPr>
+          <p:pic>
+            <p:nvPicPr>
+              <p:cNvPr id="6" name="Picture 6">
+                <a:extLst>
+                  <a:ext uri="{FF2B5EF4-FFF2-40B4-BE49-F238E27FC236}">
+                    <a16:creationId xmlns:a16="http://schemas.microsoft.com/office/drawing/2014/main" id="{E974CE4E-C46A-446A-8D4C-611FE54BC62F}"/>
+                  </a:ext>
+                </a:extLst>
+              </p:cNvPr>
+              <p:cNvPicPr>
+                <a:picLocks noChangeAspect="1" noChangeArrowheads="1"/>
+              </p:cNvPicPr>
+              <p:nvPr/>
+            </p:nvPicPr>
+            <p:blipFill>
+              <a:blip r:embed="rId5">
+                <a:extLst>
+                  <a:ext uri="{28A0092B-C50C-407E-A947-70E740481C1C}">
+                    <a14:useLocalDpi xmlns:a14="http://schemas.microsoft.com/office/drawing/2010/main" val="0"/>
+                  </a:ext>
+                </a:extLst>
+              </a:blip>
+              <a:srcRect/>
+              <a:stretch>
+                <a:fillRect/>
+              </a:stretch>
+            </p:blipFill>
+            <p:spPr bwMode="auto">
+              <a:xfrm>
+                <a:off x="1109216" y="2514600"/>
+                <a:ext cx="772238" cy="772238"/>
+              </a:xfrm>
+              <a:prstGeom prst="rect">
+                <a:avLst/>
+              </a:prstGeom>
+              <a:noFill/>
               <a:extLst>
-                <a:ext uri="{28A0092B-C50C-407E-A947-70E740481C1C}">
-                  <a14:useLocalDpi xmlns:a14="http://schemas.microsoft.com/office/drawing/2010/main" val="0"/>
+                <a:ext uri="{909E8E84-426E-40DD-AFC4-6F175D3DCCD1}">
+                  <a14:hiddenFill xmlns:a14="http://schemas.microsoft.com/office/drawing/2010/main">
+                    <a:solidFill>
+                      <a:srgbClr val="FFFFFF"/>
+                    </a:solidFill>
+                  </a14:hiddenFill>
                 </a:ext>
               </a:extLst>
-            </a:blip>
-            <a:srcRect/>
-            <a:stretch>
-              <a:fillRect/>
-            </a:stretch>
-          </p:blipFill>
-          <p:spPr bwMode="auto">
-            <a:xfrm>
-              <a:off x="4048760" y="2519680"/>
-              <a:ext cx="596265" cy="596265"/>
-            </a:xfrm>
-            <a:prstGeom prst="rect">
-              <a:avLst/>
-            </a:prstGeom>
-            <a:noFill/>
-            <a:extLst>
-              <a:ext uri="{909E8E84-426E-40DD-AFC4-6F175D3DCCD1}">
-                <a14:hiddenFill xmlns:a14="http://schemas.microsoft.com/office/drawing/2010/main">
-                  <a:solidFill>
-                    <a:srgbClr val="FFFFFF"/>
-                  </a:solidFill>
-                </a14:hiddenFill>
-              </a:ext>
-            </a:extLst>
-          </p:spPr>
-        </p:pic>
-        <p:pic>
-          <p:nvPicPr>
-            <p:cNvPr id="7" name="Picture 4">
+            </p:spPr>
+          </p:pic>
+          <p:sp>
+            <p:nvSpPr>
+              <p:cNvPr id="15" name="TextBox 14">
+                <a:extLst>
+                  <a:ext uri="{FF2B5EF4-FFF2-40B4-BE49-F238E27FC236}">
+                    <a16:creationId xmlns:a16="http://schemas.microsoft.com/office/drawing/2014/main" id="{B20E5E8D-755C-471A-9A26-0AFDB9651235}"/>
+                  </a:ext>
+                </a:extLst>
+              </p:cNvPr>
+              <p:cNvSpPr txBox="1"/>
+              <p:nvPr/>
+            </p:nvSpPr>
+            <p:spPr>
+              <a:xfrm>
+                <a:off x="1833517" y="2514600"/>
+                <a:ext cx="2309465" cy="461665"/>
+              </a:xfrm>
+              <a:prstGeom prst="rect">
+                <a:avLst/>
+              </a:prstGeom>
+              <a:noFill/>
+            </p:spPr>
+            <p:txBody>
+              <a:bodyPr wrap="square">
+                <a:spAutoFit/>
+              </a:bodyPr>
+              <a:lstStyle/>
+              <a:p>
+                <a:r>
+                  <a:rPr lang="en-US" sz="2400" b="1" dirty="0">
+                    <a:solidFill>
+                      <a:schemeClr val="bg1"/>
+                    </a:solidFill>
+                    <a:latin typeface="Courier New" panose="02070309020205020404" pitchFamily="49" charset="0"/>
+                    <a:cs typeface="Courier New" panose="02070309020205020404" pitchFamily="49" charset="0"/>
+                  </a:rPr>
+                  <a:t>-50% P</a:t>
+                </a:r>
+              </a:p>
+            </p:txBody>
+          </p:sp>
+        </p:grpSp>
+        <p:grpSp>
+          <p:nvGrpSpPr>
+            <p:cNvPr id="17" name="Group 16">
               <a:extLst>
                 <a:ext uri="{FF2B5EF4-FFF2-40B4-BE49-F238E27FC236}">
-                  <a16:creationId xmlns:a16="http://schemas.microsoft.com/office/drawing/2014/main" id="{2BCDBD1E-8627-4362-B4F9-A3E54B8D7002}"/>
+                  <a16:creationId xmlns:a16="http://schemas.microsoft.com/office/drawing/2014/main" id="{017304D6-AECB-4A5E-A411-6B7F9A6B8BF7}"/>
                 </a:ext>
               </a:extLst>
             </p:cNvPr>
-            <p:cNvPicPr>
-              <a:picLocks noChangeAspect="1" noChangeArrowheads="1"/>
-            </p:cNvPicPr>
+            <p:cNvGrpSpPr/>
             <p:nvPr/>
-          </p:nvPicPr>
-          <p:blipFill>
-            <a:blip r:embed="rId6">
+          </p:nvGrpSpPr>
+          <p:grpSpPr>
+            <a:xfrm>
+              <a:off x="7452990" y="2372740"/>
+              <a:ext cx="3227397" cy="1342189"/>
+              <a:chOff x="7452990" y="2372740"/>
+              <a:chExt cx="3227397" cy="1342189"/>
+            </a:xfrm>
+          </p:grpSpPr>
+          <p:pic>
+            <p:nvPicPr>
+              <p:cNvPr id="5" name="Picture 2">
+                <a:extLst>
+                  <a:ext uri="{FF2B5EF4-FFF2-40B4-BE49-F238E27FC236}">
+                    <a16:creationId xmlns:a16="http://schemas.microsoft.com/office/drawing/2014/main" id="{B3378E89-F7B5-41B5-A9E0-07D171424C1F}"/>
+                  </a:ext>
+                </a:extLst>
+              </p:cNvPr>
+              <p:cNvPicPr>
+                <a:picLocks noChangeAspect="1" noChangeArrowheads="1"/>
+              </p:cNvPicPr>
+              <p:nvPr/>
+            </p:nvPicPr>
+            <p:blipFill>
+              <a:blip r:embed="rId6">
+                <a:extLst>
+                  <a:ext uri="{28A0092B-C50C-407E-A947-70E740481C1C}">
+                    <a14:useLocalDpi xmlns:a14="http://schemas.microsoft.com/office/drawing/2010/main" val="0"/>
+                  </a:ext>
+                </a:extLst>
+              </a:blip>
+              <a:srcRect/>
+              <a:stretch>
+                <a:fillRect/>
+              </a:stretch>
+            </p:blipFill>
+            <p:spPr bwMode="auto">
+              <a:xfrm>
+                <a:off x="7452990" y="2372740"/>
+                <a:ext cx="977840" cy="977840"/>
+              </a:xfrm>
+              <a:prstGeom prst="rect">
+                <a:avLst/>
+              </a:prstGeom>
+              <a:noFill/>
               <a:extLst>
-                <a:ext uri="{28A0092B-C50C-407E-A947-70E740481C1C}">
-                  <a14:useLocalDpi xmlns:a14="http://schemas.microsoft.com/office/drawing/2010/main" val="0"/>
+                <a:ext uri="{909E8E84-426E-40DD-AFC4-6F175D3DCCD1}">
+                  <a14:hiddenFill xmlns:a14="http://schemas.microsoft.com/office/drawing/2010/main">
+                    <a:solidFill>
+                      <a:srgbClr val="FFFFFF"/>
+                    </a:solidFill>
+                  </a14:hiddenFill>
                 </a:ext>
               </a:extLst>
-            </a:blip>
-            <a:srcRect/>
-            <a:stretch>
-              <a:fillRect/>
-            </a:stretch>
-          </p:blipFill>
-          <p:spPr bwMode="auto">
-            <a:xfrm>
-              <a:off x="4048760" y="3732213"/>
-              <a:ext cx="596264" cy="596264"/>
-            </a:xfrm>
-            <a:prstGeom prst="rect">
-              <a:avLst/>
-            </a:prstGeom>
-            <a:noFill/>
-            <a:extLst>
-              <a:ext uri="{909E8E84-426E-40DD-AFC4-6F175D3DCCD1}">
-                <a14:hiddenFill xmlns:a14="http://schemas.microsoft.com/office/drawing/2010/main">
-                  <a:solidFill>
-                    <a:srgbClr val="FFFFFF"/>
-                  </a:solidFill>
-                </a14:hiddenFill>
-              </a:ext>
-            </a:extLst>
-          </p:spPr>
-        </p:pic>
-        <p:sp>
-          <p:nvSpPr>
-            <p:cNvPr id="11" name="TextBox 10">
-              <a:extLst>
-                <a:ext uri="{FF2B5EF4-FFF2-40B4-BE49-F238E27FC236}">
-                  <a16:creationId xmlns:a16="http://schemas.microsoft.com/office/drawing/2014/main" id="{52FD20C1-05CA-4688-92EF-F4D47EEA79FB}"/>
-                </a:ext>
-              </a:extLst>
-            </p:cNvPr>
-            <p:cNvSpPr txBox="1"/>
-            <p:nvPr/>
-          </p:nvSpPr>
-          <p:spPr>
-            <a:xfrm>
-              <a:off x="4724400" y="2519680"/>
-              <a:ext cx="2309465" cy="3416320"/>
-            </a:xfrm>
-            <a:prstGeom prst="rect">
-              <a:avLst/>
-            </a:prstGeom>
-            <a:noFill/>
-          </p:spPr>
-          <p:txBody>
-            <a:bodyPr wrap="square">
-              <a:spAutoFit/>
-            </a:bodyPr>
-            <a:lstStyle/>
-            <a:p>
-              <a:r>
-                <a:rPr lang="en-US" sz="2400" b="1" dirty="0">
-                  <a:solidFill>
-                    <a:schemeClr val="bg1"/>
-                  </a:solidFill>
-                  <a:latin typeface="Arial" panose="020B0604020202020204" pitchFamily="34" charset="0"/>
-                  <a:cs typeface="Arial" panose="020B0604020202020204" pitchFamily="34" charset="0"/>
-                </a:rPr>
-                <a:t>P     </a:t>
-              </a:r>
-              <a:r>
-                <a:rPr lang="en-US" sz="2400" dirty="0">
-                  <a:solidFill>
-                    <a:schemeClr val="bg1"/>
-                  </a:solidFill>
-                  <a:latin typeface="Arial" panose="020B0604020202020204" pitchFamily="34" charset="0"/>
-                  <a:cs typeface="Arial" panose="020B0604020202020204" pitchFamily="34" charset="0"/>
-                </a:rPr>
-                <a:t>-50%</a:t>
-              </a:r>
-            </a:p>
-            <a:p>
-              <a:endParaRPr lang="en-US" sz="2400" dirty="0">
-                <a:solidFill>
-                  <a:schemeClr val="bg1"/>
-                </a:solidFill>
-                <a:latin typeface="Arial" panose="020B0604020202020204" pitchFamily="34" charset="0"/>
-                <a:cs typeface="Arial" panose="020B0604020202020204" pitchFamily="34" charset="0"/>
-              </a:endParaRPr>
-            </a:p>
-            <a:p>
-              <a:endParaRPr lang="en-US" sz="2400" dirty="0">
-                <a:solidFill>
-                  <a:schemeClr val="bg1"/>
-                </a:solidFill>
-                <a:latin typeface="Arial" panose="020B0604020202020204" pitchFamily="34" charset="0"/>
-                <a:cs typeface="Arial" panose="020B0604020202020204" pitchFamily="34" charset="0"/>
-              </a:endParaRPr>
-            </a:p>
-            <a:p>
-              <a:r>
-                <a:rPr lang="en-US" sz="2400" dirty="0">
-                  <a:solidFill>
-                    <a:schemeClr val="bg1"/>
-                  </a:solidFill>
-                  <a:latin typeface="Arial" panose="020B0604020202020204" pitchFamily="34" charset="0"/>
-                  <a:cs typeface="Arial" panose="020B0604020202020204" pitchFamily="34" charset="0"/>
-                </a:rPr>
-                <a:t>P    +70%</a:t>
-              </a:r>
-            </a:p>
-            <a:p>
-              <a:r>
-                <a:rPr lang="en-US" sz="2400" dirty="0">
-                  <a:solidFill>
-                    <a:schemeClr val="bg1"/>
-                  </a:solidFill>
-                  <a:latin typeface="Arial" panose="020B0604020202020204" pitchFamily="34" charset="0"/>
-                  <a:cs typeface="Arial" panose="020B0604020202020204" pitchFamily="34" charset="0"/>
-                </a:rPr>
-                <a:t>C    +50%</a:t>
-              </a:r>
-            </a:p>
-            <a:p>
-              <a:endParaRPr lang="en-US" sz="2400" dirty="0">
-                <a:solidFill>
-                  <a:schemeClr val="bg1"/>
-                </a:solidFill>
-                <a:latin typeface="Arial" panose="020B0604020202020204" pitchFamily="34" charset="0"/>
-                <a:cs typeface="Arial" panose="020B0604020202020204" pitchFamily="34" charset="0"/>
-              </a:endParaRPr>
-            </a:p>
-            <a:p>
-              <a:r>
-                <a:rPr lang="en-US" sz="2400" dirty="0">
-                  <a:solidFill>
-                    <a:schemeClr val="bg1"/>
-                  </a:solidFill>
-                  <a:latin typeface="Arial" panose="020B0604020202020204" pitchFamily="34" charset="0"/>
-                  <a:cs typeface="Arial" panose="020B0604020202020204" pitchFamily="34" charset="0"/>
-                </a:rPr>
-                <a:t>P    +80%</a:t>
-              </a:r>
-            </a:p>
-            <a:p>
-              <a:r>
-                <a:rPr lang="en-US" sz="2400" dirty="0">
-                  <a:solidFill>
-                    <a:schemeClr val="bg1"/>
-                  </a:solidFill>
-                  <a:latin typeface="Arial" panose="020B0604020202020204" pitchFamily="34" charset="0"/>
-                  <a:cs typeface="Arial" panose="020B0604020202020204" pitchFamily="34" charset="0"/>
-                </a:rPr>
-                <a:t>C    -15%</a:t>
-              </a:r>
-            </a:p>
-            <a:p>
-              <a:r>
-                <a:rPr lang="en-US" sz="2400" dirty="0">
-                  <a:solidFill>
-                    <a:schemeClr val="bg1"/>
-                  </a:solidFill>
-                  <a:latin typeface="Arial" panose="020B0604020202020204" pitchFamily="34" charset="0"/>
-                  <a:cs typeface="Arial" panose="020B0604020202020204" pitchFamily="34" charset="0"/>
-                </a:rPr>
-                <a:t>…      …</a:t>
-              </a:r>
-              <a:endParaRPr lang="en-US" sz="2400" dirty="0"/>
-            </a:p>
-          </p:txBody>
-        </p:sp>
+            </p:spPr>
+          </p:pic>
+          <p:sp>
+            <p:nvSpPr>
+              <p:cNvPr id="16" name="TextBox 15">
+                <a:extLst>
+                  <a:ext uri="{FF2B5EF4-FFF2-40B4-BE49-F238E27FC236}">
+                    <a16:creationId xmlns:a16="http://schemas.microsoft.com/office/drawing/2014/main" id="{2D2C21A0-DD29-425C-8448-F6A736D5368E}"/>
+                  </a:ext>
+                </a:extLst>
+              </p:cNvPr>
+              <p:cNvSpPr txBox="1"/>
+              <p:nvPr/>
+            </p:nvSpPr>
+            <p:spPr>
+              <a:xfrm>
+                <a:off x="8370922" y="2514600"/>
+                <a:ext cx="2309465" cy="1200329"/>
+              </a:xfrm>
+              <a:prstGeom prst="rect">
+                <a:avLst/>
+              </a:prstGeom>
+              <a:noFill/>
+            </p:spPr>
+            <p:txBody>
+              <a:bodyPr wrap="square">
+                <a:spAutoFit/>
+              </a:bodyPr>
+              <a:lstStyle/>
+              <a:p>
+                <a:r>
+                  <a:rPr lang="en-US" sz="2400" b="1" dirty="0">
+                    <a:solidFill>
+                      <a:schemeClr val="bg1"/>
+                    </a:solidFill>
+                    <a:latin typeface="Courier New" panose="02070309020205020404" pitchFamily="49" charset="0"/>
+                    <a:cs typeface="Courier New" panose="02070309020205020404" pitchFamily="49" charset="0"/>
+                  </a:rPr>
+                  <a:t>+80% P</a:t>
+                </a:r>
+              </a:p>
+              <a:p>
+                <a:r>
+                  <a:rPr lang="en-US" sz="2400" b="1" dirty="0">
+                    <a:solidFill>
+                      <a:schemeClr val="bg1"/>
+                    </a:solidFill>
+                    <a:latin typeface="Courier New" panose="02070309020205020404" pitchFamily="49" charset="0"/>
+                    <a:cs typeface="Courier New" panose="02070309020205020404" pitchFamily="49" charset="0"/>
+                  </a:rPr>
+                  <a:t>-15% C</a:t>
+                </a:r>
+              </a:p>
+              <a:p>
+                <a:r>
+                  <a:rPr lang="en-US" sz="2400" b="1" dirty="0">
+                    <a:solidFill>
+                      <a:schemeClr val="bg1"/>
+                    </a:solidFill>
+                    <a:latin typeface="Courier New" panose="02070309020205020404" pitchFamily="49" charset="0"/>
+                    <a:cs typeface="Courier New" panose="02070309020205020404" pitchFamily="49" charset="0"/>
+                  </a:rPr>
+                  <a:t>+10% Yield</a:t>
+                </a:r>
+                <a:endParaRPr lang="en-US" sz="2400" b="1" dirty="0">
+                  <a:latin typeface="Courier New" panose="02070309020205020404" pitchFamily="49" charset="0"/>
+                  <a:cs typeface="Courier New" panose="02070309020205020404" pitchFamily="49" charset="0"/>
+                </a:endParaRPr>
+              </a:p>
+            </p:txBody>
+          </p:sp>
+        </p:grpSp>
       </p:grpSp>
     </p:spTree>
     <p:extLst>
       <p:ext uri="{BB962C8B-B14F-4D97-AF65-F5344CB8AC3E}">
-        <p14:creationId xmlns:p14="http://schemas.microsoft.com/office/powerpoint/2010/main" val="1419667110"/>
+        <p14:creationId xmlns:p14="http://schemas.microsoft.com/office/powerpoint/2010/main" val="2759615908"/>
       </p:ext>
     </p:extLst>
   </p:cSld>

</xml_diff>

<commit_message>
Visuals: Export to PNG, rename, reference in text
</commit_message>
<xml_diff>
--- a/submissions/burning-questions/burning-questions-visuals.pptx
+++ b/submissions/burning-questions/burning-questions-visuals.pptx
@@ -21233,7 +21233,7 @@
         </p:blipFill>
         <p:spPr bwMode="auto">
           <a:xfrm>
-            <a:off x="3642333" y="314066"/>
+            <a:off x="3852337" y="314066"/>
             <a:ext cx="304800" cy="304800"/>
           </a:xfrm>
           <a:prstGeom prst="rect">
@@ -21265,7 +21265,7 @@
         </p:nvSpPr>
         <p:spPr>
           <a:xfrm>
-            <a:off x="5176008" y="311331"/>
+            <a:off x="5386012" y="311331"/>
             <a:ext cx="885063" cy="930858"/>
           </a:xfrm>
           <a:prstGeom prst="flowChartAlternateProcess">
@@ -21323,7 +21323,7 @@
         </p:nvCxnSpPr>
         <p:spPr>
           <a:xfrm>
-            <a:off x="4080064" y="501375"/>
+            <a:off x="4290068" y="501375"/>
             <a:ext cx="905836" cy="0"/>
           </a:xfrm>
           <a:prstGeom prst="straightConnector1">
@@ -21368,7 +21368,7 @@
         </p:nvCxnSpPr>
         <p:spPr>
           <a:xfrm>
-            <a:off x="6295005" y="778283"/>
+            <a:off x="6505009" y="778283"/>
             <a:ext cx="823722" cy="0"/>
           </a:xfrm>
           <a:prstGeom prst="straightConnector1">
@@ -21426,7 +21426,7 @@
         </p:blipFill>
         <p:spPr bwMode="auto">
           <a:xfrm>
-            <a:off x="3639037" y="899808"/>
+            <a:off x="3849041" y="899808"/>
             <a:ext cx="304800" cy="304800"/>
           </a:xfrm>
           <a:prstGeom prst="rect">
@@ -21458,7 +21458,7 @@
         </p:nvSpPr>
         <p:spPr>
           <a:xfrm>
-            <a:off x="3662680" y="1052208"/>
+            <a:off x="3872684" y="1052208"/>
             <a:ext cx="457200" cy="307777"/>
           </a:xfrm>
           <a:prstGeom prst="rect">
@@ -21515,7 +21515,7 @@
         </p:blipFill>
         <p:spPr bwMode="auto">
           <a:xfrm>
-            <a:off x="5472835" y="584927"/>
+            <a:off x="5682839" y="584927"/>
             <a:ext cx="321556" cy="321556"/>
           </a:xfrm>
           <a:prstGeom prst="rect">
@@ -21549,7 +21549,7 @@
         </p:nvCxnSpPr>
         <p:spPr>
           <a:xfrm>
-            <a:off x="4080064" y="1045044"/>
+            <a:off x="4290068" y="1045044"/>
             <a:ext cx="862010" cy="0"/>
           </a:xfrm>
           <a:prstGeom prst="straightConnector1">
@@ -21592,7 +21592,7 @@
         </p:nvSpPr>
         <p:spPr>
           <a:xfrm>
-            <a:off x="3645162" y="466466"/>
+            <a:off x="3855166" y="466466"/>
             <a:ext cx="457200" cy="307777"/>
           </a:xfrm>
           <a:prstGeom prst="rect">
@@ -21649,7 +21649,7 @@
         </p:blipFill>
         <p:spPr bwMode="auto">
           <a:xfrm>
-            <a:off x="7377986" y="640967"/>
+            <a:off x="7587990" y="640967"/>
             <a:ext cx="304800" cy="304800"/>
           </a:xfrm>
           <a:prstGeom prst="rect">
@@ -21681,7 +21681,7 @@
         </p:nvSpPr>
         <p:spPr>
           <a:xfrm>
-            <a:off x="7377985" y="737267"/>
+            <a:off x="7587989" y="737267"/>
             <a:ext cx="590873" cy="307777"/>
           </a:xfrm>
           <a:prstGeom prst="rect">
@@ -21768,7 +21768,7 @@
         </p:blipFill>
         <p:spPr bwMode="auto">
           <a:xfrm>
-            <a:off x="5193908" y="999910"/>
+            <a:off x="5403912" y="999910"/>
             <a:ext cx="236430" cy="236430"/>
           </a:xfrm>
           <a:prstGeom prst="rect">
@@ -21800,7 +21800,7 @@
         </p:nvSpPr>
         <p:spPr>
           <a:xfrm>
-            <a:off x="5285272" y="939670"/>
+            <a:off x="5495276" y="939670"/>
             <a:ext cx="814551" cy="307777"/>
           </a:xfrm>
           <a:prstGeom prst="rect">
@@ -21842,7 +21842,7 @@
         </p:nvSpPr>
         <p:spPr>
           <a:xfrm>
-            <a:off x="7195525" y="1056233"/>
+            <a:off x="7405529" y="1056233"/>
             <a:ext cx="773334" cy="276999"/>
           </a:xfrm>
           <a:prstGeom prst="rect">
@@ -21912,7 +21912,7 @@
         </p:blipFill>
         <p:spPr bwMode="auto">
           <a:xfrm>
-            <a:off x="7129725" y="1052208"/>
+            <a:off x="7339729" y="1052208"/>
             <a:ext cx="238171" cy="248346"/>
           </a:xfrm>
           <a:prstGeom prst="rect">
@@ -21944,7 +21944,7 @@
         </p:nvSpPr>
         <p:spPr>
           <a:xfrm>
-            <a:off x="3485782" y="1311714"/>
+            <a:off x="3695786" y="1311714"/>
             <a:ext cx="773334" cy="276999"/>
           </a:xfrm>
           <a:prstGeom prst="rect">
@@ -22014,7 +22014,7 @@
         </p:blipFill>
         <p:spPr bwMode="auto">
           <a:xfrm>
-            <a:off x="3419982" y="1307689"/>
+            <a:off x="3629986" y="1307689"/>
             <a:ext cx="238171" cy="248346"/>
           </a:xfrm>
           <a:prstGeom prst="rect">
@@ -22061,7 +22061,7 @@
         </p:blipFill>
         <p:spPr bwMode="auto">
           <a:xfrm>
-            <a:off x="5153481" y="1385014"/>
+            <a:off x="5363485" y="1385014"/>
             <a:ext cx="304800" cy="304800"/>
           </a:xfrm>
           <a:prstGeom prst="rect">
@@ -22093,7 +22093,7 @@
         </p:nvSpPr>
         <p:spPr>
           <a:xfrm>
-            <a:off x="5294631" y="1432430"/>
+            <a:off x="5504635" y="1432430"/>
             <a:ext cx="397917" cy="307777"/>
           </a:xfrm>
           <a:prstGeom prst="rect">
@@ -22135,7 +22135,7 @@
         </p:nvSpPr>
         <p:spPr>
           <a:xfrm>
-            <a:off x="4038600" y="1828800"/>
+            <a:off x="4248604" y="1828800"/>
             <a:ext cx="4738876" cy="307777"/>
           </a:xfrm>
           <a:prstGeom prst="rect">
@@ -22222,7 +22222,7 @@
         </p:blipFill>
         <p:spPr bwMode="auto">
           <a:xfrm>
-            <a:off x="4086950" y="1888498"/>
+            <a:off x="4296954" y="1888498"/>
             <a:ext cx="236430" cy="236430"/>
           </a:xfrm>
           <a:prstGeom prst="rect">
@@ -22269,7 +22269,7 @@
         </p:blipFill>
         <p:spPr bwMode="auto">
           <a:xfrm>
-            <a:off x="5681298" y="1403635"/>
+            <a:off x="5891302" y="1403635"/>
             <a:ext cx="304800" cy="304800"/>
           </a:xfrm>
           <a:prstGeom prst="rect">
@@ -22316,7 +22316,7 @@
         </p:blipFill>
         <p:spPr bwMode="auto">
           <a:xfrm>
-            <a:off x="3541387" y="1752950"/>
+            <a:off x="3751391" y="1752950"/>
             <a:ext cx="507526" cy="507526"/>
           </a:xfrm>
           <a:prstGeom prst="rect">
@@ -22363,7 +22363,7 @@
         </p:blipFill>
         <p:spPr bwMode="auto">
           <a:xfrm>
-            <a:off x="3461117" y="2226745"/>
+            <a:off x="3671121" y="2226745"/>
             <a:ext cx="304800" cy="304800"/>
           </a:xfrm>
           <a:prstGeom prst="rect">
@@ -22410,7 +22410,7 @@
         </p:blipFill>
         <p:spPr bwMode="auto">
           <a:xfrm>
-            <a:off x="3744113" y="2226745"/>
+            <a:off x="3954117" y="2226745"/>
             <a:ext cx="304800" cy="304800"/>
           </a:xfrm>
           <a:prstGeom prst="rect">
@@ -22457,7 +22457,7 @@
         </p:blipFill>
         <p:spPr bwMode="auto">
           <a:xfrm>
-            <a:off x="3181930" y="2226745"/>
+            <a:off x="3391934" y="2226745"/>
             <a:ext cx="304800" cy="304800"/>
           </a:xfrm>
           <a:prstGeom prst="rect">
@@ -22504,7 +22504,7 @@
         </p:blipFill>
         <p:spPr bwMode="auto">
           <a:xfrm>
-            <a:off x="4026724" y="2226745"/>
+            <a:off x="4236728" y="2226745"/>
             <a:ext cx="304800" cy="304800"/>
           </a:xfrm>
           <a:prstGeom prst="rect">

</xml_diff>